<commit_message>
Update GymNest představení projektu.pptx
</commit_message>
<xml_diff>
--- a/GymNest představení projektu.pptx
+++ b/GymNest představení projektu.pptx
@@ -224,7 +224,7 @@
           <a:p>
             <a:fld id="{5FD2D0BA-DB5F-4AA6-AD46-9F001552A8A7}" type="datetimeFigureOut">
               <a:rPr lang="cs-CZ" smtClean="0"/>
-              <a:t>10.03.2024</a:t>
+              <a:t>13.03.2024</a:t>
             </a:fld>
             <a:endParaRPr lang="cs-CZ"/>
           </a:p>
@@ -402,7 +402,7 @@
           <a:p>
             <a:fld id="{BD433A40-CB7C-4082-8730-747021FE674D}" type="datetimeFigureOut">
               <a:rPr lang="cs-CZ" noProof="0" smtClean="0"/>
-              <a:t>10.03.2024</a:t>
+              <a:t>13.03.2024</a:t>
             </a:fld>
             <a:endParaRPr lang="cs-CZ" noProof="0"/>
           </a:p>
@@ -798,6 +798,189 @@
           <a:bodyPr/>
           <a:lstStyle/>
           <a:p>
+            <a:pPr marL="228600" indent="-228600">
+              <a:buAutoNum type="arabicPeriod"/>
+            </a:pPr>
+            <a:r>
+              <a:rPr lang="cs-CZ" dirty="0"/>
+              <a:t>Uživatelská správa</a:t>
+            </a:r>
+          </a:p>
+          <a:p>
+            <a:pPr marL="0" indent="0">
+              <a:buNone/>
+            </a:pPr>
+            <a:r>
+              <a:rPr lang="cs-CZ" dirty="0"/>
+              <a:t>- Autentizace a autorizace uživatelů.</a:t>
+            </a:r>
+          </a:p>
+          <a:p>
+            <a:pPr marL="0" indent="0">
+              <a:buNone/>
+            </a:pPr>
+            <a:r>
+              <a:rPr lang="cs-CZ" dirty="0"/>
+              <a:t>- Profily členů a zaměstnanců.</a:t>
+            </a:r>
+          </a:p>
+          <a:p>
+            <a:pPr marL="0" indent="0">
+              <a:buNone/>
+            </a:pPr>
+            <a:r>
+              <a:rPr lang="cs-CZ" dirty="0"/>
+              <a:t>- Správa rolí a přístupových práv.</a:t>
+            </a:r>
+          </a:p>
+          <a:p>
+            <a:pPr marL="0" indent="0">
+              <a:buNone/>
+            </a:pPr>
+            <a:endParaRPr lang="cs-CZ" dirty="0"/>
+          </a:p>
+          <a:p>
+            <a:pPr marL="0" indent="0">
+              <a:buNone/>
+            </a:pPr>
+            <a:r>
+              <a:rPr lang="cs-CZ" dirty="0"/>
+              <a:t>2. Správa členství</a:t>
+            </a:r>
+          </a:p>
+          <a:p>
+            <a:pPr marL="0" indent="0">
+              <a:buNone/>
+            </a:pPr>
+            <a:r>
+              <a:rPr lang="cs-CZ" dirty="0"/>
+              <a:t>- Správa různých typů členství a tarifů.</a:t>
+            </a:r>
+          </a:p>
+          <a:p>
+            <a:pPr marL="0" indent="0">
+              <a:buNone/>
+            </a:pPr>
+            <a:r>
+              <a:rPr lang="cs-CZ" dirty="0"/>
+              <a:t>- Sledování platby členství. </a:t>
+            </a:r>
+          </a:p>
+          <a:p>
+            <a:pPr marL="0" indent="0">
+              <a:buNone/>
+            </a:pPr>
+            <a:endParaRPr lang="cs-CZ" dirty="0"/>
+          </a:p>
+          <a:p>
+            <a:pPr marL="0" indent="0">
+              <a:buNone/>
+            </a:pPr>
+            <a:r>
+              <a:rPr lang="cs-CZ" dirty="0"/>
+              <a:t>3. Rezervační systém </a:t>
+            </a:r>
+          </a:p>
+          <a:p>
+            <a:pPr marL="0" indent="0">
+              <a:buNone/>
+            </a:pPr>
+            <a:r>
+              <a:rPr lang="cs-CZ" dirty="0"/>
+              <a:t>- Rezervace skupinových lekcí a osobního tréninku.</a:t>
+            </a:r>
+          </a:p>
+          <a:p>
+            <a:pPr marL="0" indent="0">
+              <a:buNone/>
+            </a:pPr>
+            <a:r>
+              <a:rPr lang="cs-CZ" dirty="0"/>
+              <a:t>- Správa časového harmonogramu pro lekce a trenéry.</a:t>
+            </a:r>
+          </a:p>
+        </p:txBody>
+      </p:sp>
+      <p:sp>
+        <p:nvSpPr>
+          <p:cNvPr id="4" name="Zástupný symbol pro číslo snímku 3"/>
+          <p:cNvSpPr>
+            <a:spLocks noGrp="1"/>
+          </p:cNvSpPr>
+          <p:nvPr>
+            <p:ph type="sldNum" sz="quarter" idx="5"/>
+          </p:nvPr>
+        </p:nvSpPr>
+        <p:spPr/>
+        <p:txBody>
+          <a:bodyPr/>
+          <a:lstStyle/>
+          <a:p>
+            <a:fld id="{B31B96DB-7961-4665-BC0B-0E94575174E2}" type="slidenum">
+              <a:rPr lang="cs-CZ" noProof="0" smtClean="0"/>
+              <a:t>3</a:t>
+            </a:fld>
+            <a:endParaRPr lang="cs-CZ" noProof="0"/>
+          </a:p>
+        </p:txBody>
+      </p:sp>
+    </p:spTree>
+    <p:extLst>
+      <p:ext uri="{BB962C8B-B14F-4D97-AF65-F5344CB8AC3E}">
+        <p14:creationId xmlns:p14="http://schemas.microsoft.com/office/powerpoint/2010/main" val="70768809"/>
+      </p:ext>
+    </p:extLst>
+  </p:cSld>
+  <p:clrMapOvr>
+    <a:masterClrMapping/>
+  </p:clrMapOvr>
+</p:notes>
+</file>
+
+<file path=ppt/notesSlides/notesSlide3.xml><?xml version="1.0" encoding="utf-8"?>
+<p:notes xmlns:a="http://schemas.openxmlformats.org/drawingml/2006/main" xmlns:r="http://schemas.openxmlformats.org/officeDocument/2006/relationships" xmlns:p="http://schemas.openxmlformats.org/presentationml/2006/main">
+  <p:cSld>
+    <p:spTree>
+      <p:nvGrpSpPr>
+        <p:cNvPr id="1" name=""/>
+        <p:cNvGrpSpPr/>
+        <p:nvPr/>
+      </p:nvGrpSpPr>
+      <p:grpSpPr>
+        <a:xfrm>
+          <a:off x="0" y="0"/>
+          <a:ext cx="0" cy="0"/>
+          <a:chOff x="0" y="0"/>
+          <a:chExt cx="0" cy="0"/>
+        </a:xfrm>
+      </p:grpSpPr>
+      <p:sp>
+        <p:nvSpPr>
+          <p:cNvPr id="2" name="Zástupný symbol pro obrázek snímku 1"/>
+          <p:cNvSpPr>
+            <a:spLocks noGrp="1" noRot="1" noChangeAspect="1"/>
+          </p:cNvSpPr>
+          <p:nvPr>
+            <p:ph type="sldImg"/>
+          </p:nvPr>
+        </p:nvSpPr>
+        <p:spPr/>
+      </p:sp>
+      <p:sp>
+        <p:nvSpPr>
+          <p:cNvPr id="3" name="Zástupný symbol pro poznámky 2"/>
+          <p:cNvSpPr>
+            <a:spLocks noGrp="1"/>
+          </p:cNvSpPr>
+          <p:nvPr>
+            <p:ph type="body" idx="1"/>
+          </p:nvPr>
+        </p:nvSpPr>
+        <p:spPr/>
+        <p:txBody>
+          <a:bodyPr/>
+          <a:lstStyle/>
+          <a:p>
             <a:r>
               <a:rPr lang="cs-CZ" dirty="0"/>
               <a:t>Důvodů, proč chtít náš systém je více. </a:t>
@@ -859,7 +1042,7 @@
 </p:notes>
 </file>
 
-<file path=ppt/notesSlides/notesSlide3.xml><?xml version="1.0" encoding="utf-8"?>
+<file path=ppt/notesSlides/notesSlide4.xml><?xml version="1.0" encoding="utf-8"?>
 <p:notes xmlns:a="http://schemas.openxmlformats.org/drawingml/2006/main" xmlns:r="http://schemas.openxmlformats.org/officeDocument/2006/relationships" xmlns:p="http://schemas.openxmlformats.org/presentationml/2006/main">
   <p:cSld>
     <p:spTree>
@@ -1189,7 +1372,7 @@
             <a:pPr rtl="0"/>
             <a:fld id="{E4CF67D5-7113-4F58-90C9-7936E219A927}" type="datetime1">
               <a:rPr lang="cs-CZ" noProof="0" smtClean="0"/>
-              <a:t>10.03.2024</a:t>
+              <a:t>13.03.2024</a:t>
             </a:fld>
             <a:endParaRPr lang="cs-CZ" noProof="0"/>
           </a:p>
@@ -1454,7 +1637,7 @@
             <a:pPr rtl="0"/>
             <a:fld id="{D6CBE8CE-5C92-4D1A-BE9B-39275DD4E21B}" type="datetime1">
               <a:rPr lang="cs-CZ" noProof="0" smtClean="0"/>
-              <a:t>10.03.2024</a:t>
+              <a:t>13.03.2024</a:t>
             </a:fld>
             <a:endParaRPr lang="cs-CZ" noProof="0"/>
           </a:p>
@@ -1692,7 +1875,7 @@
             <a:pPr rtl="0"/>
             <a:fld id="{FB233EC6-32EC-40F2-A899-8731B976E638}" type="datetime1">
               <a:rPr lang="cs-CZ" noProof="0" smtClean="0"/>
-              <a:t>10.03.2024</a:t>
+              <a:t>13.03.2024</a:t>
             </a:fld>
             <a:endParaRPr lang="cs-CZ" noProof="0"/>
           </a:p>
@@ -1935,7 +2118,7 @@
             <a:pPr rtl="0"/>
             <a:fld id="{67B7B60F-068D-4530-981A-D64FDAEE4042}" type="datetime1">
               <a:rPr lang="cs-CZ" noProof="0" smtClean="0"/>
-              <a:t>10.03.2024</a:t>
+              <a:t>13.03.2024</a:t>
             </a:fld>
             <a:endParaRPr lang="cs-CZ" noProof="0"/>
           </a:p>
@@ -2246,7 +2429,7 @@
             <a:pPr rtl="0"/>
             <a:fld id="{50E77078-8498-416E-8C2B-44BCB10DADE3}" type="datetime1">
               <a:rPr lang="cs-CZ" noProof="0" smtClean="0"/>
-              <a:t>10.03.2024</a:t>
+              <a:t>13.03.2024</a:t>
             </a:fld>
             <a:endParaRPr lang="cs-CZ" noProof="0"/>
           </a:p>
@@ -2550,7 +2733,7 @@
             <a:pPr rtl="0"/>
             <a:fld id="{EE2425AC-A8CC-4FD5-80CB-DB62F33CC7E2}" type="datetime1">
               <a:rPr lang="cs-CZ" noProof="0" smtClean="0"/>
-              <a:t>10.03.2024</a:t>
+              <a:t>13.03.2024</a:t>
             </a:fld>
             <a:endParaRPr lang="cs-CZ" noProof="0"/>
           </a:p>
@@ -2974,7 +3157,7 @@
             <a:pPr rtl="0"/>
             <a:fld id="{4673C0A0-F997-4689-B91B-3C30EE9CB784}" type="datetime1">
               <a:rPr lang="cs-CZ" noProof="0" smtClean="0"/>
-              <a:t>10.03.2024</a:t>
+              <a:t>13.03.2024</a:t>
             </a:fld>
             <a:endParaRPr lang="cs-CZ" noProof="0"/>
           </a:p>
@@ -3073,7 +3256,7 @@
             <a:pPr rtl="0"/>
             <a:fld id="{282786CC-6742-46F7-827E-F58BF345F5D8}" type="datetime1">
               <a:rPr lang="cs-CZ" noProof="0" smtClean="0"/>
-              <a:t>10.03.2024</a:t>
+              <a:t>13.03.2024</a:t>
             </a:fld>
             <a:endParaRPr lang="cs-CZ" noProof="0"/>
           </a:p>
@@ -3239,7 +3422,7 @@
             <a:pPr rtl="0"/>
             <a:fld id="{2F952648-A78A-4608-9A01-2A97839C2F58}" type="datetime1">
               <a:rPr lang="cs-CZ" noProof="0" smtClean="0"/>
-              <a:t>10.03.2024</a:t>
+              <a:t>13.03.2024</a:t>
             </a:fld>
             <a:endParaRPr lang="cs-CZ" noProof="0"/>
           </a:p>
@@ -3620,7 +3803,7 @@
             <a:pPr rtl="0"/>
             <a:fld id="{6A62E91A-98DC-4F55-B956-A4A34416FE5F}" type="datetime1">
               <a:rPr lang="cs-CZ" noProof="0" smtClean="0"/>
-              <a:t>10.03.2024</a:t>
+              <a:t>13.03.2024</a:t>
             </a:fld>
             <a:endParaRPr lang="cs-CZ" noProof="0"/>
           </a:p>
@@ -3913,7 +4096,7 @@
             <a:pPr rtl="0"/>
             <a:fld id="{1CFB8D6C-5A19-4086-8755-0C0638DA7ADB}" type="datetime1">
               <a:rPr lang="cs-CZ" noProof="0" smtClean="0"/>
-              <a:t>10.03.2024</a:t>
+              <a:t>13.03.2024</a:t>
             </a:fld>
             <a:endParaRPr lang="cs-CZ" noProof="0"/>
           </a:p>
@@ -4127,7 +4310,7 @@
             <a:pPr rtl="0"/>
             <a:fld id="{68A20929-4667-4121-800C-DB300D315348}" type="datetime1">
               <a:rPr lang="cs-CZ" noProof="0" smtClean="0"/>
-              <a:t>10.03.2024</a:t>
+              <a:t>13.03.2024</a:t>
             </a:fld>
             <a:endParaRPr lang="cs-CZ" noProof="0"/>
           </a:p>
@@ -5194,14 +5377,13 @@
           </a:bodyPr>
           <a:lstStyle/>
           <a:p>
-            <a:pPr rtl="0"/>
             <a:r>
               <a:rPr lang="cs-CZ" dirty="0">
                 <a:solidFill>
                   <a:srgbClr val="75E4F7"/>
                 </a:solidFill>
               </a:rPr>
-              <a:t>Matěj Boura a Jan Sakač</a:t>
+              <a:t>Jan Sakač a Matěj Boura</a:t>
             </a:r>
           </a:p>
         </p:txBody>
@@ -6423,6 +6605,83 @@
           </a:p>
         </p:txBody>
       </p:sp>
+      <p:pic>
+        <p:nvPicPr>
+          <p:cNvPr id="4" name="Obrázek 3">
+            <a:extLst>
+              <a:ext uri="{FF2B5EF4-FFF2-40B4-BE49-F238E27FC236}">
+                <a16:creationId xmlns:a16="http://schemas.microsoft.com/office/drawing/2014/main" id="{B45123B4-0573-7826-1AB5-8C283355D92D}"/>
+              </a:ext>
+            </a:extLst>
+          </p:cNvPr>
+          <p:cNvPicPr>
+            <a:picLocks noChangeAspect="1"/>
+          </p:cNvPicPr>
+          <p:nvPr/>
+        </p:nvPicPr>
+        <p:blipFill>
+          <a:blip r:embed="rId3"/>
+          <a:stretch>
+            <a:fillRect/>
+          </a:stretch>
+        </p:blipFill>
+        <p:spPr>
+          <a:xfrm>
+            <a:off x="581192" y="1961744"/>
+            <a:ext cx="11351309" cy="4795516"/>
+          </a:xfrm>
+          <a:prstGeom prst="rect">
+            <a:avLst/>
+          </a:prstGeom>
+        </p:spPr>
+      </p:pic>
+      <p:pic>
+        <p:nvPicPr>
+          <p:cNvPr id="1026" name="Picture 2" descr="PushPress Software Reviews, Demo &amp; Pricing - 2023">
+            <a:extLst>
+              <a:ext uri="{FF2B5EF4-FFF2-40B4-BE49-F238E27FC236}">
+                <a16:creationId xmlns:a16="http://schemas.microsoft.com/office/drawing/2014/main" id="{8727AE3D-4DB4-B1D1-BFFD-7984CB3B4937}"/>
+              </a:ext>
+            </a:extLst>
+          </p:cNvPr>
+          <p:cNvPicPr>
+            <a:picLocks noChangeAspect="1" noChangeArrowheads="1"/>
+          </p:cNvPicPr>
+          <p:nvPr/>
+        </p:nvPicPr>
+        <p:blipFill>
+          <a:blip r:embed="rId4">
+            <a:extLst>
+              <a:ext uri="{28A0092B-C50C-407E-A947-70E740481C1C}">
+                <a14:useLocalDpi xmlns:a14="http://schemas.microsoft.com/office/drawing/2010/main" val="0"/>
+              </a:ext>
+            </a:extLst>
+          </a:blip>
+          <a:srcRect/>
+          <a:stretch>
+            <a:fillRect/>
+          </a:stretch>
+        </p:blipFill>
+        <p:spPr bwMode="auto">
+          <a:xfrm>
+            <a:off x="2037314" y="1961744"/>
+            <a:ext cx="7495494" cy="4996995"/>
+          </a:xfrm>
+          <a:prstGeom prst="rect">
+            <a:avLst/>
+          </a:prstGeom>
+          <a:noFill/>
+          <a:extLst>
+            <a:ext uri="{909E8E84-426E-40DD-AFC4-6F175D3DCCD1}">
+              <a14:hiddenFill xmlns:a14="http://schemas.microsoft.com/office/drawing/2010/main">
+                <a:solidFill>
+                  <a:srgbClr val="FFFFFF"/>
+                </a:solidFill>
+              </a14:hiddenFill>
+            </a:ext>
+          </a:extLst>
+        </p:spPr>
+      </p:pic>
     </p:spTree>
     <p:extLst>
       <p:ext uri="{BB962C8B-B14F-4D97-AF65-F5344CB8AC3E}">
@@ -6433,6 +6692,298 @@
   <p:clrMapOvr>
     <a:masterClrMapping/>
   </p:clrMapOvr>
+  <p:timing>
+    <p:tnLst>
+      <p:par>
+        <p:cTn id="1" dur="indefinite" restart="never" nodeType="tmRoot">
+          <p:childTnLst>
+            <p:seq concurrent="1" nextAc="seek">
+              <p:cTn id="2" dur="indefinite" nodeType="mainSeq">
+                <p:childTnLst>
+                  <p:par>
+                    <p:cTn id="3" fill="hold">
+                      <p:stCondLst>
+                        <p:cond delay="indefinite"/>
+                      </p:stCondLst>
+                      <p:childTnLst>
+                        <p:par>
+                          <p:cTn id="4" fill="hold">
+                            <p:stCondLst>
+                              <p:cond delay="0"/>
+                            </p:stCondLst>
+                            <p:childTnLst>
+                              <p:par>
+                                <p:cTn id="5" presetID="22" presetClass="entr" presetSubtype="4" fill="hold" nodeType="clickEffect">
+                                  <p:stCondLst>
+                                    <p:cond delay="0"/>
+                                  </p:stCondLst>
+                                  <p:childTnLst>
+                                    <p:set>
+                                      <p:cBhvr>
+                                        <p:cTn id="6" dur="1" fill="hold">
+                                          <p:stCondLst>
+                                            <p:cond delay="0"/>
+                                          </p:stCondLst>
+                                        </p:cTn>
+                                        <p:tgtEl>
+                                          <p:spTgt spid="4"/>
+                                        </p:tgtEl>
+                                        <p:attrNameLst>
+                                          <p:attrName>style.visibility</p:attrName>
+                                        </p:attrNameLst>
+                                      </p:cBhvr>
+                                      <p:to>
+                                        <p:strVal val="visible"/>
+                                      </p:to>
+                                    </p:set>
+                                    <p:animEffect transition="in" filter="wipe(down)">
+                                      <p:cBhvr>
+                                        <p:cTn id="7" dur="500"/>
+                                        <p:tgtEl>
+                                          <p:spTgt spid="4"/>
+                                        </p:tgtEl>
+                                      </p:cBhvr>
+                                    </p:animEffect>
+                                  </p:childTnLst>
+                                </p:cTn>
+                              </p:par>
+                            </p:childTnLst>
+                          </p:cTn>
+                        </p:par>
+                      </p:childTnLst>
+                    </p:cTn>
+                  </p:par>
+                  <p:par>
+                    <p:cTn id="8" fill="hold">
+                      <p:stCondLst>
+                        <p:cond delay="indefinite"/>
+                      </p:stCondLst>
+                      <p:childTnLst>
+                        <p:par>
+                          <p:cTn id="9" fill="hold">
+                            <p:stCondLst>
+                              <p:cond delay="0"/>
+                            </p:stCondLst>
+                            <p:childTnLst>
+                              <p:par>
+                                <p:cTn id="10" presetID="1" presetClass="exit" presetSubtype="0" fill="hold" nodeType="clickEffect">
+                                  <p:stCondLst>
+                                    <p:cond delay="0"/>
+                                  </p:stCondLst>
+                                  <p:childTnLst>
+                                    <p:set>
+                                      <p:cBhvr>
+                                        <p:cTn id="11" dur="1" fill="hold">
+                                          <p:stCondLst>
+                                            <p:cond delay="0"/>
+                                          </p:stCondLst>
+                                        </p:cTn>
+                                        <p:tgtEl>
+                                          <p:spTgt spid="4"/>
+                                        </p:tgtEl>
+                                        <p:attrNameLst>
+                                          <p:attrName>style.visibility</p:attrName>
+                                        </p:attrNameLst>
+                                      </p:cBhvr>
+                                      <p:to>
+                                        <p:strVal val="hidden"/>
+                                      </p:to>
+                                    </p:set>
+                                  </p:childTnLst>
+                                </p:cTn>
+                              </p:par>
+                              <p:par>
+                                <p:cTn id="12" presetID="10" presetClass="exit" presetSubtype="0" fill="hold" nodeType="withEffect">
+                                  <p:stCondLst>
+                                    <p:cond delay="0"/>
+                                  </p:stCondLst>
+                                  <p:childTnLst>
+                                    <p:animEffect transition="out" filter="fade">
+                                      <p:cBhvr>
+                                        <p:cTn id="13" dur="500"/>
+                                        <p:tgtEl>
+                                          <p:spTgt spid="3">
+                                            <p:txEl>
+                                              <p:pRg st="0" end="0"/>
+                                            </p:txEl>
+                                          </p:spTgt>
+                                        </p:tgtEl>
+                                      </p:cBhvr>
+                                    </p:animEffect>
+                                    <p:set>
+                                      <p:cBhvr>
+                                        <p:cTn id="14" dur="1" fill="hold">
+                                          <p:stCondLst>
+                                            <p:cond delay="499"/>
+                                          </p:stCondLst>
+                                        </p:cTn>
+                                        <p:tgtEl>
+                                          <p:spTgt spid="3">
+                                            <p:txEl>
+                                              <p:pRg st="0" end="0"/>
+                                            </p:txEl>
+                                          </p:spTgt>
+                                        </p:tgtEl>
+                                        <p:attrNameLst>
+                                          <p:attrName>style.visibility</p:attrName>
+                                        </p:attrNameLst>
+                                      </p:cBhvr>
+                                      <p:to>
+                                        <p:strVal val="hidden"/>
+                                      </p:to>
+                                    </p:set>
+                                  </p:childTnLst>
+                                </p:cTn>
+                              </p:par>
+                              <p:par>
+                                <p:cTn id="15" presetID="10" presetClass="exit" presetSubtype="0" fill="hold" nodeType="withEffect">
+                                  <p:stCondLst>
+                                    <p:cond delay="0"/>
+                                  </p:stCondLst>
+                                  <p:childTnLst>
+                                    <p:animEffect transition="out" filter="fade">
+                                      <p:cBhvr>
+                                        <p:cTn id="16" dur="500"/>
+                                        <p:tgtEl>
+                                          <p:spTgt spid="3">
+                                            <p:txEl>
+                                              <p:pRg st="1" end="1"/>
+                                            </p:txEl>
+                                          </p:spTgt>
+                                        </p:tgtEl>
+                                      </p:cBhvr>
+                                    </p:animEffect>
+                                    <p:set>
+                                      <p:cBhvr>
+                                        <p:cTn id="17" dur="1" fill="hold">
+                                          <p:stCondLst>
+                                            <p:cond delay="499"/>
+                                          </p:stCondLst>
+                                        </p:cTn>
+                                        <p:tgtEl>
+                                          <p:spTgt spid="3">
+                                            <p:txEl>
+                                              <p:pRg st="1" end="1"/>
+                                            </p:txEl>
+                                          </p:spTgt>
+                                        </p:tgtEl>
+                                        <p:attrNameLst>
+                                          <p:attrName>style.visibility</p:attrName>
+                                        </p:attrNameLst>
+                                      </p:cBhvr>
+                                      <p:to>
+                                        <p:strVal val="hidden"/>
+                                      </p:to>
+                                    </p:set>
+                                  </p:childTnLst>
+                                </p:cTn>
+                              </p:par>
+                              <p:par>
+                                <p:cTn id="18" presetID="10" presetClass="exit" presetSubtype="0" fill="hold" nodeType="withEffect">
+                                  <p:stCondLst>
+                                    <p:cond delay="0"/>
+                                  </p:stCondLst>
+                                  <p:childTnLst>
+                                    <p:animEffect transition="out" filter="fade">
+                                      <p:cBhvr>
+                                        <p:cTn id="19" dur="500"/>
+                                        <p:tgtEl>
+                                          <p:spTgt spid="3">
+                                            <p:txEl>
+                                              <p:pRg st="2" end="2"/>
+                                            </p:txEl>
+                                          </p:spTgt>
+                                        </p:tgtEl>
+                                      </p:cBhvr>
+                                    </p:animEffect>
+                                    <p:set>
+                                      <p:cBhvr>
+                                        <p:cTn id="20" dur="1" fill="hold">
+                                          <p:stCondLst>
+                                            <p:cond delay="499"/>
+                                          </p:stCondLst>
+                                        </p:cTn>
+                                        <p:tgtEl>
+                                          <p:spTgt spid="3">
+                                            <p:txEl>
+                                              <p:pRg st="2" end="2"/>
+                                            </p:txEl>
+                                          </p:spTgt>
+                                        </p:tgtEl>
+                                        <p:attrNameLst>
+                                          <p:attrName>style.visibility</p:attrName>
+                                        </p:attrNameLst>
+                                      </p:cBhvr>
+                                      <p:to>
+                                        <p:strVal val="hidden"/>
+                                      </p:to>
+                                    </p:set>
+                                  </p:childTnLst>
+                                </p:cTn>
+                              </p:par>
+                              <p:par>
+                                <p:cTn id="21" presetID="10" presetClass="entr" presetSubtype="0" fill="hold" nodeType="withEffect">
+                                  <p:stCondLst>
+                                    <p:cond delay="250"/>
+                                  </p:stCondLst>
+                                  <p:childTnLst>
+                                    <p:set>
+                                      <p:cBhvr>
+                                        <p:cTn id="22" dur="1" fill="hold">
+                                          <p:stCondLst>
+                                            <p:cond delay="0"/>
+                                          </p:stCondLst>
+                                        </p:cTn>
+                                        <p:tgtEl>
+                                          <p:spTgt spid="1026"/>
+                                        </p:tgtEl>
+                                        <p:attrNameLst>
+                                          <p:attrName>style.visibility</p:attrName>
+                                        </p:attrNameLst>
+                                      </p:cBhvr>
+                                      <p:to>
+                                        <p:strVal val="visible"/>
+                                      </p:to>
+                                    </p:set>
+                                    <p:animEffect transition="in" filter="fade">
+                                      <p:cBhvr>
+                                        <p:cTn id="23" dur="500"/>
+                                        <p:tgtEl>
+                                          <p:spTgt spid="1026"/>
+                                        </p:tgtEl>
+                                      </p:cBhvr>
+                                    </p:animEffect>
+                                  </p:childTnLst>
+                                </p:cTn>
+                              </p:par>
+                            </p:childTnLst>
+                          </p:cTn>
+                        </p:par>
+                      </p:childTnLst>
+                    </p:cTn>
+                  </p:par>
+                </p:childTnLst>
+              </p:cTn>
+              <p:prevCondLst>
+                <p:cond evt="onPrev" delay="0">
+                  <p:tgtEl>
+                    <p:sldTgt/>
+                  </p:tgtEl>
+                </p:cond>
+              </p:prevCondLst>
+              <p:nextCondLst>
+                <p:cond evt="onNext" delay="0">
+                  <p:tgtEl>
+                    <p:sldTgt/>
+                  </p:tgtEl>
+                </p:cond>
+              </p:nextCondLst>
+            </p:seq>
+          </p:childTnLst>
+        </p:cTn>
+      </p:par>
+    </p:tnLst>
+  </p:timing>
 </p:sld>
 </file>
 
@@ -7701,7 +8252,27 @@
           <a:p>
             <a:r>
               <a:rPr lang="cs-CZ" sz="2000" dirty="0"/>
-              <a:t>Správa různých typů členství a tarifů</a:t>
+              <a:t>Správa různých typů členství a tarifů (</a:t>
+            </a:r>
+            <a:r>
+              <a:rPr lang="cs-CZ" sz="2000" dirty="0" err="1"/>
+              <a:t>tiers</a:t>
+            </a:r>
+            <a:r>
+              <a:rPr lang="cs-CZ" sz="2000" dirty="0"/>
+              <a:t>)</a:t>
+            </a:r>
+          </a:p>
+          <a:p>
+            <a:r>
+              <a:rPr lang="cs-CZ" sz="2000" dirty="0"/>
+              <a:t>Různé měny</a:t>
+            </a:r>
+          </a:p>
+          <a:p>
+            <a:r>
+              <a:rPr lang="cs-CZ" sz="2000" dirty="0"/>
+              <a:t>Výběr barevných schémat</a:t>
             </a:r>
           </a:p>
           <a:p>
@@ -7818,7 +8389,7 @@
         </p:blipFill>
         <p:spPr bwMode="auto">
           <a:xfrm>
-            <a:off x="4613946" y="3632128"/>
+            <a:off x="4613946" y="4026668"/>
             <a:ext cx="2848818" cy="1602460"/>
           </a:xfrm>
           <a:prstGeom prst="rect">
@@ -7865,7 +8436,7 @@
         </p:blipFill>
         <p:spPr bwMode="auto">
           <a:xfrm>
-            <a:off x="7789200" y="3429000"/>
+            <a:off x="7725485" y="3838794"/>
             <a:ext cx="2008716" cy="2008716"/>
           </a:xfrm>
           <a:prstGeom prst="rect">
@@ -8756,6 +9327,15 @@
 </file>
 
 <file path=customXml/item1.xml><?xml version="1.0" encoding="utf-8"?>
+<?mso-contentType ?>
+<FormTemplates xmlns="http://schemas.microsoft.com/sharepoint/v3/contenttype/forms">
+  <Display>DocumentLibraryForm</Display>
+  <Edit>DocumentLibraryForm</Edit>
+  <New>DocumentLibraryForm</New>
+</FormTemplates>
+</file>
+
+<file path=customXml/item2.xml><?xml version="1.0" encoding="utf-8"?>
 <ct:contentTypeSchema xmlns:ct="http://schemas.microsoft.com/office/2006/metadata/contentType" xmlns:ma="http://schemas.microsoft.com/office/2006/metadata/properties/metaAttributes" ct:_="" ma:_="" ma:contentTypeName="Document" ma:contentTypeID="0x01010079F111ED35F8CC479449609E8A0923A6" ma:contentTypeVersion="11" ma:contentTypeDescription="Create a new document." ma:contentTypeScope="" ma:versionID="1c2eb7a32e66fb6e4260f3771546a5e2">
   <xsd:schema xmlns:xsd="http://www.w3.org/2001/XMLSchema" xmlns:xs="http://www.w3.org/2001/XMLSchema" xmlns:p="http://schemas.microsoft.com/office/2006/metadata/properties" xmlns:ns2="71af3243-3dd4-4a8d-8c0d-dd76da1f02a5" xmlns:ns3="16c05727-aa75-4e4a-9b5f-8a80a1165891" targetNamespace="http://schemas.microsoft.com/office/2006/metadata/properties" ma:root="true" ma:fieldsID="04e1f6479c48b08974ba73b5ca973489" ns2:_="" ns3:_="">
     <xsd:import namespace="71af3243-3dd4-4a8d-8c0d-dd76da1f02a5"/>
@@ -8966,15 +9546,6 @@
 </ct:contentTypeSchema>
 </file>
 
-<file path=customXml/item2.xml><?xml version="1.0" encoding="utf-8"?>
-<?mso-contentType ?>
-<FormTemplates xmlns="http://schemas.microsoft.com/sharepoint/v3/contenttype/forms">
-  <Display>DocumentLibraryForm</Display>
-  <Edit>DocumentLibraryForm</Edit>
-  <New>DocumentLibraryForm</New>
-</FormTemplates>
-</file>
-
 <file path=customXml/item3.xml><?xml version="1.0" encoding="utf-8"?>
 <p:properties xmlns:p="http://schemas.microsoft.com/office/2006/metadata/properties" xmlns:xsi="http://www.w3.org/2001/XMLSchema-instance" xmlns:pc="http://schemas.microsoft.com/office/infopath/2007/PartnerControls">
   <documentManagement>
@@ -8984,6 +9555,14 @@
 </file>
 
 <file path=customXml/itemProps1.xml><?xml version="1.0" encoding="utf-8"?>
+<ds:datastoreItem xmlns:ds="http://schemas.openxmlformats.org/officeDocument/2006/customXml" ds:itemID="{BA0CF3B2-1F0F-4FC5-8002-3E4869ABAD55}">
+  <ds:schemaRefs>
+    <ds:schemaRef ds:uri="http://schemas.microsoft.com/sharepoint/v3/contenttype/forms"/>
+  </ds:schemaRefs>
+</ds:datastoreItem>
+</file>
+
+<file path=customXml/itemProps2.xml><?xml version="1.0" encoding="utf-8"?>
 <ds:datastoreItem xmlns:ds="http://schemas.openxmlformats.org/officeDocument/2006/customXml" ds:itemID="{1F69AFF4-BB30-4BA0-AD22-82CC3C43276B}">
   <ds:schemaRefs>
     <ds:schemaRef ds:uri="http://schemas.microsoft.com/office/2006/metadata/contentType"/>
@@ -9002,14 +9581,6 @@
 </ds:datastoreItem>
 </file>
 
-<file path=customXml/itemProps2.xml><?xml version="1.0" encoding="utf-8"?>
-<ds:datastoreItem xmlns:ds="http://schemas.openxmlformats.org/officeDocument/2006/customXml" ds:itemID="{BA0CF3B2-1F0F-4FC5-8002-3E4869ABAD55}">
-  <ds:schemaRefs>
-    <ds:schemaRef ds:uri="http://schemas.microsoft.com/sharepoint/v3/contenttype/forms"/>
-  </ds:schemaRefs>
-</ds:datastoreItem>
-</file>
-
 <file path=customXml/itemProps3.xml><?xml version="1.0" encoding="utf-8"?>
 <ds:datastoreItem xmlns:ds="http://schemas.openxmlformats.org/officeDocument/2006/customXml" ds:itemID="{1EBC12AA-1C15-4500-BC9C-8EE83A441DE9}">
   <ds:schemaRefs>

</xml_diff>